<commit_message>
atualização dos slides do workshop
</commit_message>
<xml_diff>
--- a/Workshop_SistemaBancario.pptx
+++ b/Workshop_SistemaBancario.pptx
@@ -1015,7 +1015,7 @@
                 <a14:useLocalDpi xmlns:a14="http://schemas.microsoft.com/office/drawing/2010/main" val="0"/>
               </a:ext>
               <a:ext uri="{96DAC541-7B7A-43D3-8B79-37D633B846F1}">
-                <asvg:svgBlip xmlns="" xmlns:asvg="http://schemas.microsoft.com/office/drawing/2016/SVG/main" r:embed="rId4"/>
+                <asvg:svgBlip xmlns:asvg="http://schemas.microsoft.com/office/drawing/2016/SVG/main" xmlns="" r:embed="rId4"/>
               </a:ext>
             </a:extLst>
           </a:blip>
@@ -1068,7 +1068,7 @@
                 <a14:useLocalDpi xmlns:a14="http://schemas.microsoft.com/office/drawing/2010/main" val="0"/>
               </a:ext>
               <a:ext uri="{96DAC541-7B7A-43D3-8B79-37D633B846F1}">
-                <asvg:svgBlip xmlns="" xmlns:asvg="http://schemas.microsoft.com/office/drawing/2016/SVG/main" r:embed="rId6"/>
+                <asvg:svgBlip xmlns:asvg="http://schemas.microsoft.com/office/drawing/2016/SVG/main" xmlns="" r:embed="rId6"/>
               </a:ext>
             </a:extLst>
           </a:blip>
@@ -1158,7 +1158,7 @@
                 <a14:useLocalDpi xmlns:a14="http://schemas.microsoft.com/office/drawing/2010/main" val="0"/>
               </a:ext>
               <a:ext uri="{96DAC541-7B7A-43D3-8B79-37D633B846F1}">
-                <asvg:svgBlip xmlns="" xmlns:asvg="http://schemas.microsoft.com/office/drawing/2016/SVG/main" r:embed="rId4"/>
+                <asvg:svgBlip xmlns:asvg="http://schemas.microsoft.com/office/drawing/2016/SVG/main" xmlns="" r:embed="rId4"/>
               </a:ext>
             </a:extLst>
           </a:blip>
@@ -1285,7 +1285,7 @@
                 <a14:useLocalDpi xmlns:a14="http://schemas.microsoft.com/office/drawing/2010/main" val="0"/>
               </a:ext>
               <a:ext uri="{96DAC541-7B7A-43D3-8B79-37D633B846F1}">
-                <asvg:svgBlip xmlns="" xmlns:asvg="http://schemas.microsoft.com/office/drawing/2016/SVG/main" r:embed="rId7"/>
+                <asvg:svgBlip xmlns:asvg="http://schemas.microsoft.com/office/drawing/2016/SVG/main" xmlns="" r:embed="rId7"/>
               </a:ext>
             </a:extLst>
           </a:blip>
@@ -1574,7 +1574,7 @@
   </dgm:layoutNode>
   <dgm:extLst>
     <a:ext uri="{68A01E43-0DF5-4B5B-8FA6-DAF915123BFB}">
-      <dgm1612:lstStyle xmlns="" xmlns:dgm1612="http://schemas.microsoft.com/office/drawing/2016/12/diagram">
+      <dgm1612:lstStyle xmlns:dgm1612="http://schemas.microsoft.com/office/drawing/2016/12/diagram" xmlns="">
         <a:lvl1pPr>
           <a:lnSpc>
             <a:spcPct val="100000"/>
@@ -5472,7 +5472,7 @@
                 <a16:creationId xmlns:a16="http://schemas.microsoft.com/office/drawing/2014/main" id="{E91DC736-0EF8-4F87-9146-EBF1D2EE4D3D}"/>
               </a:ext>
               <a:ext uri="{C183D7F6-B498-43B3-948B-1728B52AA6E4}">
-                <adec:decorative xmlns="" xmlns:adec="http://schemas.microsoft.com/office/drawing/2017/decorative" val="1"/>
+                <adec:decorative xmlns:adec="http://schemas.microsoft.com/office/drawing/2017/decorative" xmlns="" val="1"/>
               </a:ext>
             </a:extLst>
           </p:cNvPr>
@@ -5561,7 +5561,7 @@
                 <a16:creationId xmlns:a16="http://schemas.microsoft.com/office/drawing/2014/main" id="{097CD68E-23E3-4007-8847-CD0944C4F7BE}"/>
               </a:ext>
               <a:ext uri="{C183D7F6-B498-43B3-948B-1728B52AA6E4}">
-                <adec:decorative xmlns="" xmlns:adec="http://schemas.microsoft.com/office/drawing/2017/decorative" val="1"/>
+                <adec:decorative xmlns:adec="http://schemas.microsoft.com/office/drawing/2017/decorative" xmlns="" val="1"/>
               </a:ext>
             </a:extLst>
           </p:cNvPr>
@@ -5729,7 +5729,7 @@
                 <a16:creationId xmlns:a16="http://schemas.microsoft.com/office/drawing/2014/main" id="{AF2F604E-43BE-4DC3-B983-E071523364F8}"/>
               </a:ext>
               <a:ext uri="{C183D7F6-B498-43B3-948B-1728B52AA6E4}">
-                <adec:decorative xmlns="" xmlns:adec="http://schemas.microsoft.com/office/drawing/2017/decorative" val="1"/>
+                <adec:decorative xmlns:adec="http://schemas.microsoft.com/office/drawing/2017/decorative" xmlns="" val="1"/>
               </a:ext>
             </a:extLst>
           </p:cNvPr>
@@ -5797,7 +5797,7 @@
                 <a16:creationId xmlns:a16="http://schemas.microsoft.com/office/drawing/2014/main" id="{08C9B587-E65E-4B52-B37C-ABEBB6E87928}"/>
               </a:ext>
               <a:ext uri="{C183D7F6-B498-43B3-948B-1728B52AA6E4}">
-                <adec:decorative xmlns="" xmlns:adec="http://schemas.microsoft.com/office/drawing/2017/decorative" val="1"/>
+                <adec:decorative xmlns:adec="http://schemas.microsoft.com/office/drawing/2017/decorative" xmlns="" val="1"/>
               </a:ext>
             </a:extLst>
           </p:cNvPr>
@@ -6131,7 +6131,7 @@
                 <a16:creationId xmlns:a16="http://schemas.microsoft.com/office/drawing/2014/main" id="{D4771268-CB57-404A-9271-370EB28F6090}"/>
               </a:ext>
               <a:ext uri="{C183D7F6-B498-43B3-948B-1728B52AA6E4}">
-                <adec:decorative xmlns="" xmlns:adec="http://schemas.microsoft.com/office/drawing/2017/decorative" val="1"/>
+                <adec:decorative xmlns:adec="http://schemas.microsoft.com/office/drawing/2017/decorative" xmlns="" val="1"/>
               </a:ext>
             </a:extLst>
           </p:cNvPr>
@@ -6250,7 +6250,7 @@
         </p:blipFill>
         <p:spPr>
           <a:xfrm>
-            <a:off x="5455959" y="643466"/>
+            <a:off x="5544094" y="456524"/>
             <a:ext cx="5423414" cy="5568739"/>
           </a:xfrm>
           <a:prstGeom prst="rect">
@@ -6258,6 +6258,34 @@
           </a:prstGeom>
         </p:spPr>
       </p:pic>
+      <p:sp>
+        <p:nvSpPr>
+          <p:cNvPr id="3" name="Retângulo 2"/>
+          <p:cNvSpPr/>
+          <p:nvPr/>
+        </p:nvSpPr>
+        <p:spPr>
+          <a:xfrm>
+            <a:off x="514120" y="6212205"/>
+            <a:ext cx="6878198" cy="369332"/>
+          </a:xfrm>
+          <a:prstGeom prst="rect">
+            <a:avLst/>
+          </a:prstGeom>
+        </p:spPr>
+        <p:txBody>
+          <a:bodyPr wrap="square">
+            <a:spAutoFit/>
+          </a:bodyPr>
+          <a:lstStyle/>
+          <a:p>
+            <a:r>
+              <a:rPr lang="pt-BR" dirty="0"/>
+              <a:t>https://github.com/edsonmfeitosa/Workshop_Sistema_Bancario</a:t>
+            </a:r>
+          </a:p>
+        </p:txBody>
+      </p:sp>
     </p:spTree>
     <p:extLst>
       <p:ext uri="{BB962C8B-B14F-4D97-AF65-F5344CB8AC3E}">
@@ -6449,7 +6477,7 @@
                 <a16:creationId xmlns:a16="http://schemas.microsoft.com/office/drawing/2014/main" id="{12C63567-9A18-430B-817B-152D609F572F}"/>
               </a:ext>
               <a:ext uri="{C183D7F6-B498-43B3-948B-1728B52AA6E4}">
-                <adec:decorative xmlns="" xmlns:adec="http://schemas.microsoft.com/office/drawing/2017/decorative" val="1"/>
+                <adec:decorative xmlns:adec="http://schemas.microsoft.com/office/drawing/2017/decorative" xmlns="" val="1"/>
               </a:ext>
             </a:extLst>
           </p:cNvPr>
@@ -6806,7 +6834,7 @@
                 <a16:creationId xmlns:a16="http://schemas.microsoft.com/office/drawing/2014/main" id="{327D73B4-9F5C-4A64-A179-51B9500CB8B5}"/>
               </a:ext>
               <a:ext uri="{C183D7F6-B498-43B3-948B-1728B52AA6E4}">
-                <adec:decorative xmlns="" xmlns:adec="http://schemas.microsoft.com/office/drawing/2017/decorative" val="1"/>
+                <adec:decorative xmlns:adec="http://schemas.microsoft.com/office/drawing/2017/decorative" xmlns="" val="1"/>
               </a:ext>
             </a:extLst>
           </p:cNvPr>
@@ -6866,7 +6894,7 @@
                 <a16:creationId xmlns:a16="http://schemas.microsoft.com/office/drawing/2014/main" id="{C1F06963-6374-4B48-844F-071A9BAAAE02}"/>
               </a:ext>
               <a:ext uri="{C183D7F6-B498-43B3-948B-1728B52AA6E4}">
-                <adec:decorative xmlns="" xmlns:adec="http://schemas.microsoft.com/office/drawing/2017/decorative" val="1"/>
+                <adec:decorative xmlns:adec="http://schemas.microsoft.com/office/drawing/2017/decorative" xmlns="" val="1"/>
               </a:ext>
             </a:extLst>
           </p:cNvPr>
@@ -6972,7 +7000,7 @@
                 <a16:creationId xmlns:a16="http://schemas.microsoft.com/office/drawing/2014/main" id="{6CB927A4-E432-4310-9CD5-E89FF5063179}"/>
               </a:ext>
               <a:ext uri="{C183D7F6-B498-43B3-948B-1728B52AA6E4}">
-                <adec:decorative xmlns="" xmlns:adec="http://schemas.microsoft.com/office/drawing/2017/decorative" val="1"/>
+                <adec:decorative xmlns:adec="http://schemas.microsoft.com/office/drawing/2017/decorative" xmlns="" val="1"/>
               </a:ext>
             </a:extLst>
           </p:cNvPr>
@@ -7183,7 +7211,7 @@
                 <a16:creationId xmlns:a16="http://schemas.microsoft.com/office/drawing/2014/main" id="{1453BF6C-B012-48B7-B4E8-6D7AC7C27D02}"/>
               </a:ext>
               <a:ext uri="{C183D7F6-B498-43B3-948B-1728B52AA6E4}">
-                <adec:decorative xmlns="" xmlns:adec="http://schemas.microsoft.com/office/drawing/2017/decorative" val="1"/>
+                <adec:decorative xmlns:adec="http://schemas.microsoft.com/office/drawing/2017/decorative" xmlns="" val="1"/>
               </a:ext>
             </a:extLst>
           </p:cNvPr>
@@ -7453,7 +7481,7 @@
                 <a16:creationId xmlns:a16="http://schemas.microsoft.com/office/drawing/2014/main" id="{E3020543-B24B-4EC4-8FFC-8DD88EEA91A8}"/>
               </a:ext>
               <a:ext uri="{C183D7F6-B498-43B3-948B-1728B52AA6E4}">
-                <adec:decorative xmlns="" xmlns:adec="http://schemas.microsoft.com/office/drawing/2017/decorative" val="1"/>
+                <adec:decorative xmlns:adec="http://schemas.microsoft.com/office/drawing/2017/decorative" xmlns="" val="1"/>
               </a:ext>
             </a:extLst>
           </p:cNvPr>
@@ -7560,7 +7588,7 @@
                 <a16:creationId xmlns:a16="http://schemas.microsoft.com/office/drawing/2014/main" id="{C49DA8F6-BCC1-4447-B54C-57856834B94B}"/>
               </a:ext>
               <a:ext uri="{C183D7F6-B498-43B3-948B-1728B52AA6E4}">
-                <adec:decorative xmlns="" xmlns:adec="http://schemas.microsoft.com/office/drawing/2017/decorative" val="1"/>
+                <adec:decorative xmlns:adec="http://schemas.microsoft.com/office/drawing/2017/decorative" xmlns="" val="1"/>
               </a:ext>
             </a:extLst>
           </p:cNvPr>
@@ -7660,7 +7688,7 @@
                 <a16:creationId xmlns:a16="http://schemas.microsoft.com/office/drawing/2014/main" id="{6753252F-4873-4F63-801D-CC719279A7D5}"/>
               </a:ext>
               <a:ext uri="{C183D7F6-B498-43B3-948B-1728B52AA6E4}">
-                <adec:decorative xmlns="" xmlns:adec="http://schemas.microsoft.com/office/drawing/2017/decorative" val="1"/>
+                <adec:decorative xmlns:adec="http://schemas.microsoft.com/office/drawing/2017/decorative" xmlns="" val="1"/>
               </a:ext>
             </a:extLst>
           </p:cNvPr>
@@ -7723,7 +7751,7 @@
                 <a16:creationId xmlns:a16="http://schemas.microsoft.com/office/drawing/2014/main" id="{047C8CCB-F95D-4249-92DD-651249D3535A}"/>
               </a:ext>
               <a:ext uri="{C183D7F6-B498-43B3-948B-1728B52AA6E4}">
-                <adec:decorative xmlns="" xmlns:adec="http://schemas.microsoft.com/office/drawing/2017/decorative" val="1"/>
+                <adec:decorative xmlns:adec="http://schemas.microsoft.com/office/drawing/2017/decorative" xmlns="" val="1"/>
               </a:ext>
             </a:extLst>
           </p:cNvPr>
@@ -7979,7 +8007,7 @@
                 <a16:creationId xmlns:a16="http://schemas.microsoft.com/office/drawing/2014/main" id="{1503BFE4-729B-D9D0-C17B-501E6AF1127A}"/>
               </a:ext>
               <a:ext uri="{C183D7F6-B498-43B3-948B-1728B52AA6E4}">
-                <adec:decorative xmlns="" xmlns:adec="http://schemas.microsoft.com/office/drawing/2017/decorative" val="1"/>
+                <adec:decorative xmlns:adec="http://schemas.microsoft.com/office/drawing/2017/decorative" xmlns="" val="1"/>
               </a:ext>
             </a:extLst>
           </p:cNvPr>

</xml_diff>